<commit_message>
10 pattern and tactics note finish
</commit_message>
<xml_diff>
--- a/for_test/10_Patterns_and_tactics.pptx
+++ b/for_test/10_Patterns_and_tactics.pptx
@@ -5,10 +5,10 @@
     <p:sldMasterId id="2147483648" r:id="rId1"/>
   </p:sldMasterIdLst>
   <p:notesMasterIdLst>
-    <p:notesMasterId r:id="rId61"/>
+    <p:notesMasterId r:id="rId60"/>
   </p:notesMasterIdLst>
   <p:handoutMasterIdLst>
-    <p:handoutMasterId r:id="rId62"/>
+    <p:handoutMasterId r:id="rId61"/>
   </p:handoutMasterIdLst>
   <p:sldIdLst>
     <p:sldId id="786" r:id="rId2"/>
@@ -67,9 +67,8 @@
     <p:sldId id="2049" r:id="rId55"/>
     <p:sldId id="2050" r:id="rId56"/>
     <p:sldId id="2051" r:id="rId57"/>
-    <p:sldId id="2052" r:id="rId58"/>
-    <p:sldId id="2053" r:id="rId59"/>
-    <p:sldId id="2054" r:id="rId60"/>
+    <p:sldId id="2053" r:id="rId58"/>
+    <p:sldId id="2054" r:id="rId59"/>
   </p:sldIdLst>
   <p:sldSz cx="12192000" cy="6858000"/>
   <p:notesSz cx="6797675" cy="9929813"/>
@@ -269,7 +268,7 @@
           <a:p>
             <a:fld id="{40F1FFF7-2BA0-475E-BFE7-C3F82A9A6946}" type="datetimeFigureOut">
               <a:rPr lang="en-GB" smtClean="0"/>
-              <a:t>02/05/2023</a:t>
+              <a:t>04/05/2023</a:t>
             </a:fld>
             <a:endParaRPr lang="en-GB" dirty="0"/>
           </a:p>
@@ -434,7 +433,7 @@
           <a:p>
             <a:fld id="{D299A35E-D7B7-4081-8EA2-331D8425DDD3}" type="datetimeFigureOut">
               <a:rPr lang="en-US" smtClean="0"/>
-              <a:t>5/2/2023</a:t>
+              <a:t>5/4/2023</a:t>
             </a:fld>
             <a:endParaRPr lang="en-US" dirty="0"/>
           </a:p>
@@ -2521,7 +2520,7 @@
           <a:p>
             <a:fld id="{2C8DE5C2-993C-4607-B26D-D4750998D4EC}" type="datetimeFigureOut">
               <a:rPr lang="en-US" smtClean="0"/>
-              <a:t>5/2/2023</a:t>
+              <a:t>5/4/2023</a:t>
             </a:fld>
             <a:endParaRPr lang="en-US" dirty="0"/>
           </a:p>
@@ -2719,7 +2718,7 @@
           <a:p>
             <a:fld id="{2C8DE5C2-993C-4607-B26D-D4750998D4EC}" type="datetimeFigureOut">
               <a:rPr lang="en-US" smtClean="0"/>
-              <a:t>5/2/2023</a:t>
+              <a:t>5/4/2023</a:t>
             </a:fld>
             <a:endParaRPr lang="en-US" dirty="0"/>
           </a:p>
@@ -2927,7 +2926,7 @@
           <a:p>
             <a:fld id="{2C8DE5C2-993C-4607-B26D-D4750998D4EC}" type="datetimeFigureOut">
               <a:rPr lang="en-US" smtClean="0"/>
-              <a:t>5/2/2023</a:t>
+              <a:t>5/4/2023</a:t>
             </a:fld>
             <a:endParaRPr lang="en-US" dirty="0"/>
           </a:p>
@@ -3125,7 +3124,7 @@
           <a:p>
             <a:fld id="{2C8DE5C2-993C-4607-B26D-D4750998D4EC}" type="datetimeFigureOut">
               <a:rPr lang="en-US" smtClean="0"/>
-              <a:t>5/2/2023</a:t>
+              <a:t>5/4/2023</a:t>
             </a:fld>
             <a:endParaRPr lang="en-US" dirty="0"/>
           </a:p>
@@ -3400,7 +3399,7 @@
           <a:p>
             <a:fld id="{2C8DE5C2-993C-4607-B26D-D4750998D4EC}" type="datetimeFigureOut">
               <a:rPr lang="en-US" smtClean="0"/>
-              <a:t>5/2/2023</a:t>
+              <a:t>5/4/2023</a:t>
             </a:fld>
             <a:endParaRPr lang="en-US" dirty="0"/>
           </a:p>
@@ -3665,7 +3664,7 @@
           <a:p>
             <a:fld id="{2C8DE5C2-993C-4607-B26D-D4750998D4EC}" type="datetimeFigureOut">
               <a:rPr lang="en-US" smtClean="0"/>
-              <a:t>5/2/2023</a:t>
+              <a:t>5/4/2023</a:t>
             </a:fld>
             <a:endParaRPr lang="en-US" dirty="0"/>
           </a:p>
@@ -4077,7 +4076,7 @@
           <a:p>
             <a:fld id="{2C8DE5C2-993C-4607-B26D-D4750998D4EC}" type="datetimeFigureOut">
               <a:rPr lang="en-US" smtClean="0"/>
-              <a:t>5/2/2023</a:t>
+              <a:t>5/4/2023</a:t>
             </a:fld>
             <a:endParaRPr lang="en-US" dirty="0"/>
           </a:p>
@@ -4218,7 +4217,7 @@
           <a:p>
             <a:fld id="{2C8DE5C2-993C-4607-B26D-D4750998D4EC}" type="datetimeFigureOut">
               <a:rPr lang="en-US" smtClean="0"/>
-              <a:t>5/2/2023</a:t>
+              <a:t>5/4/2023</a:t>
             </a:fld>
             <a:endParaRPr lang="en-US" dirty="0"/>
           </a:p>
@@ -4331,7 +4330,7 @@
           <a:p>
             <a:fld id="{2C8DE5C2-993C-4607-B26D-D4750998D4EC}" type="datetimeFigureOut">
               <a:rPr lang="en-US" smtClean="0"/>
-              <a:t>5/2/2023</a:t>
+              <a:t>5/4/2023</a:t>
             </a:fld>
             <a:endParaRPr lang="en-US" dirty="0"/>
           </a:p>
@@ -4642,7 +4641,7 @@
           <a:p>
             <a:fld id="{2C8DE5C2-993C-4607-B26D-D4750998D4EC}" type="datetimeFigureOut">
               <a:rPr lang="en-US" smtClean="0"/>
-              <a:t>5/2/2023</a:t>
+              <a:t>5/4/2023</a:t>
             </a:fld>
             <a:endParaRPr lang="en-US" dirty="0"/>
           </a:p>
@@ -4930,7 +4929,7 @@
           <a:p>
             <a:fld id="{2C8DE5C2-993C-4607-B26D-D4750998D4EC}" type="datetimeFigureOut">
               <a:rPr lang="en-US" smtClean="0"/>
-              <a:t>5/2/2023</a:t>
+              <a:t>5/4/2023</a:t>
             </a:fld>
             <a:endParaRPr lang="en-US" dirty="0"/>
           </a:p>
@@ -5171,7 +5170,7 @@
           <a:p>
             <a:fld id="{2C8DE5C2-993C-4607-B26D-D4750998D4EC}" type="datetimeFigureOut">
               <a:rPr lang="en-US" smtClean="0"/>
-              <a:t>5/2/2023</a:t>
+              <a:t>5/4/2023</a:t>
             </a:fld>
             <a:endParaRPr lang="en-US" dirty="0"/>
           </a:p>
@@ -32297,63 +32296,6 @@
       </p:sp>
       <p:sp>
         <p:nvSpPr>
-          <p:cNvPr id="3" name="日期占位符 2">
-            <a:extLst>
-              <a:ext uri="{FF2B5EF4-FFF2-40B4-BE49-F238E27FC236}">
-                <a16:creationId xmlns:a16="http://schemas.microsoft.com/office/drawing/2014/main" id="{72DC2C88-0238-4AB7-BD38-675DBB0795C2}"/>
-              </a:ext>
-            </a:extLst>
-          </p:cNvPr>
-          <p:cNvSpPr>
-            <a:spLocks noGrp="1"/>
-          </p:cNvSpPr>
-          <p:nvPr>
-            <p:ph type="dt" sz="half" idx="10"/>
-          </p:nvPr>
-        </p:nvSpPr>
-        <p:spPr/>
-        <p:txBody>
-          <a:bodyPr/>
-          <a:lstStyle/>
-          <a:p>
-            <a:pPr marL="0" marR="0" lvl="0" indent="0" algn="l" defTabSz="914400" rtl="0" eaLnBrk="1" fontAlgn="auto" latinLnBrk="0" hangingPunct="1">
-              <a:lnSpc>
-                <a:spcPct val="100000"/>
-              </a:lnSpc>
-              <a:spcBef>
-                <a:spcPts val="0"/>
-              </a:spcBef>
-              <a:spcAft>
-                <a:spcPts val="0"/>
-              </a:spcAft>
-              <a:buClrTx/>
-              <a:buSzTx/>
-              <a:buFontTx/>
-              <a:buNone/>
-              <a:tabLst/>
-              <a:defRPr/>
-            </a:pPr>
-            <a:endParaRPr kumimoji="0" lang="en-AU" sz="1200" b="0" i="0" u="none" strike="noStrike" kern="1200" cap="none" spc="0" normalizeH="0" baseline="0" noProof="0">
-              <a:ln>
-                <a:noFill/>
-              </a:ln>
-              <a:solidFill>
-                <a:prstClr val="black">
-                  <a:tint val="75000"/>
-                </a:prstClr>
-              </a:solidFill>
-              <a:effectLst/>
-              <a:uLnTx/>
-              <a:uFillTx/>
-              <a:latin typeface="Calibri" panose="020F0502020204030204"/>
-              <a:ea typeface="+mn-ea"/>
-              <a:cs typeface="+mn-cs"/>
-            </a:endParaRPr>
-          </a:p>
-        </p:txBody>
-      </p:sp>
-      <p:sp>
-        <p:nvSpPr>
           <p:cNvPr id="4" name="灯片编号占位符 3">
             <a:extLst>
               <a:ext uri="{FF2B5EF4-FFF2-40B4-BE49-F238E27FC236}">
@@ -33479,7 +33421,7 @@
                 <a:defRPr/>
               </a:pPr>
               <a:r>
-                <a:rPr kumimoji="0" lang="en-US" sz="1400" b="0" i="0" u="none" strike="noStrike" kern="1200" cap="none" spc="0" normalizeH="0" baseline="0" noProof="0">
+                <a:rPr kumimoji="0" lang="en-US" sz="1400" b="0" i="0" u="none" strike="noStrike" kern="1200" cap="none" spc="0" normalizeH="0" baseline="0" noProof="0" dirty="0">
                   <a:ln>
                     <a:noFill/>
                   </a:ln>
@@ -33515,7 +33457,7 @@
                 <a:defRPr/>
               </a:pPr>
               <a:r>
-                <a:rPr kumimoji="0" lang="en-US" sz="1400" b="0" i="0" u="none" strike="noStrike" kern="1200" cap="none" spc="0" normalizeH="0" baseline="0" noProof="0">
+                <a:rPr kumimoji="0" lang="en-US" sz="1400" b="0" i="0" u="none" strike="noStrike" kern="1200" cap="none" spc="0" normalizeH="0" baseline="0" noProof="0" dirty="0">
                   <a:ln>
                     <a:noFill/>
                   </a:ln>
@@ -33724,7 +33666,7 @@
                 <a:defRPr/>
               </a:pPr>
               <a:r>
-                <a:rPr kumimoji="0" lang="en-US" sz="1400" b="0" i="0" u="none" strike="noStrike" kern="1200" cap="none" spc="0" normalizeH="0" baseline="0" noProof="0">
+                <a:rPr kumimoji="0" lang="en-US" sz="1400" b="0" i="0" u="none" strike="noStrike" kern="1200" cap="none" spc="0" normalizeH="0" baseline="0" noProof="0" dirty="0">
                   <a:ln>
                     <a:noFill/>
                   </a:ln>
@@ -33760,7 +33702,7 @@
                 <a:defRPr/>
               </a:pPr>
               <a:r>
-                <a:rPr kumimoji="0" lang="en-US" sz="1400" b="0" i="0" u="none" strike="noStrike" kern="1200" cap="none" spc="0" normalizeH="0" baseline="0" noProof="0">
+                <a:rPr kumimoji="0" lang="en-US" sz="1400" b="0" i="0" u="none" strike="noStrike" kern="1200" cap="none" spc="0" normalizeH="0" baseline="0" noProof="0" dirty="0">
                   <a:ln>
                     <a:noFill/>
                   </a:ln>
@@ -34900,401 +34842,6 @@
             <p:ph idx="1"/>
           </p:nvPr>
         </p:nvSpPr>
-        <p:spPr>
-          <a:xfrm>
-            <a:off x="838200" y="1835564"/>
-            <a:ext cx="10515600" cy="4351338"/>
-          </a:xfrm>
-        </p:spPr>
-        <p:txBody>
-          <a:bodyPr>
-            <a:normAutofit/>
-          </a:bodyPr>
-          <a:lstStyle/>
-          <a:p>
-            <a:r>
-              <a:rPr lang="en-US" sz="3600" dirty="0"/>
-              <a:t>Each use of tactic introduces new concerns.</a:t>
-            </a:r>
-          </a:p>
-          <a:p>
-            <a:r>
-              <a:rPr lang="en-US" sz="3600" dirty="0"/>
-              <a:t>Each new concern causes new tactics to be added.</a:t>
-            </a:r>
-          </a:p>
-          <a:p>
-            <a:r>
-              <a:rPr lang="en-US" sz="3600" dirty="0"/>
-              <a:t>Are we in an infinite progression?</a:t>
-            </a:r>
-          </a:p>
-        </p:txBody>
-      </p:sp>
-      <p:sp>
-        <p:nvSpPr>
-          <p:cNvPr id="4" name="Footer Placeholder 3"/>
-          <p:cNvSpPr>
-            <a:spLocks noGrp="1"/>
-          </p:cNvSpPr>
-          <p:nvPr>
-            <p:ph type="ftr" sz="quarter" idx="4294967295"/>
-          </p:nvPr>
-        </p:nvSpPr>
-        <p:spPr>
-          <a:xfrm>
-            <a:off x="0" y="6356350"/>
-            <a:ext cx="6337300" cy="365125"/>
-          </a:xfrm>
-          <a:prstGeom prst="rect">
-            <a:avLst/>
-          </a:prstGeom>
-        </p:spPr>
-        <p:txBody>
-          <a:bodyPr vert="horz" lIns="91440" tIns="45720" rIns="91440" bIns="45720" rtlCol="0" anchor="ctr"/>
-          <a:lstStyle>
-            <a:defPPr>
-              <a:defRPr lang="en-US"/>
-            </a:defPPr>
-            <a:lvl1pPr marL="0" algn="ctr" defTabSz="914400" rtl="0" eaLnBrk="1" latinLnBrk="0" hangingPunct="1">
-              <a:defRPr sz="1200" kern="1200">
-                <a:solidFill>
-                  <a:schemeClr val="tx1">
-                    <a:tint val="75000"/>
-                  </a:schemeClr>
-                </a:solidFill>
-                <a:latin typeface="+mn-lt"/>
-                <a:ea typeface="+mn-ea"/>
-                <a:cs typeface="+mn-cs"/>
-              </a:defRPr>
-            </a:lvl1pPr>
-            <a:lvl2pPr marL="457200" algn="l" defTabSz="914400" rtl="0" eaLnBrk="1" latinLnBrk="0" hangingPunct="1">
-              <a:defRPr sz="1800" kern="1200">
-                <a:solidFill>
-                  <a:schemeClr val="tx1"/>
-                </a:solidFill>
-                <a:latin typeface="+mn-lt"/>
-                <a:ea typeface="+mn-ea"/>
-                <a:cs typeface="+mn-cs"/>
-              </a:defRPr>
-            </a:lvl2pPr>
-            <a:lvl3pPr marL="914400" algn="l" defTabSz="914400" rtl="0" eaLnBrk="1" latinLnBrk="0" hangingPunct="1">
-              <a:defRPr sz="1800" kern="1200">
-                <a:solidFill>
-                  <a:schemeClr val="tx1"/>
-                </a:solidFill>
-                <a:latin typeface="+mn-lt"/>
-                <a:ea typeface="+mn-ea"/>
-                <a:cs typeface="+mn-cs"/>
-              </a:defRPr>
-            </a:lvl3pPr>
-            <a:lvl4pPr marL="1371600" algn="l" defTabSz="914400" rtl="0" eaLnBrk="1" latinLnBrk="0" hangingPunct="1">
-              <a:defRPr sz="1800" kern="1200">
-                <a:solidFill>
-                  <a:schemeClr val="tx1"/>
-                </a:solidFill>
-                <a:latin typeface="+mn-lt"/>
-                <a:ea typeface="+mn-ea"/>
-                <a:cs typeface="+mn-cs"/>
-              </a:defRPr>
-            </a:lvl4pPr>
-            <a:lvl5pPr marL="1828800" algn="l" defTabSz="914400" rtl="0" eaLnBrk="1" latinLnBrk="0" hangingPunct="1">
-              <a:defRPr sz="1800" kern="1200">
-                <a:solidFill>
-                  <a:schemeClr val="tx1"/>
-                </a:solidFill>
-                <a:latin typeface="+mn-lt"/>
-                <a:ea typeface="+mn-ea"/>
-                <a:cs typeface="+mn-cs"/>
-              </a:defRPr>
-            </a:lvl5pPr>
-            <a:lvl6pPr marL="2286000" algn="l" defTabSz="914400" rtl="0" eaLnBrk="1" latinLnBrk="0" hangingPunct="1">
-              <a:defRPr sz="1800" kern="1200">
-                <a:solidFill>
-                  <a:schemeClr val="tx1"/>
-                </a:solidFill>
-                <a:latin typeface="+mn-lt"/>
-                <a:ea typeface="+mn-ea"/>
-                <a:cs typeface="+mn-cs"/>
-              </a:defRPr>
-            </a:lvl6pPr>
-            <a:lvl7pPr marL="2743200" algn="l" defTabSz="914400" rtl="0" eaLnBrk="1" latinLnBrk="0" hangingPunct="1">
-              <a:defRPr sz="1800" kern="1200">
-                <a:solidFill>
-                  <a:schemeClr val="tx1"/>
-                </a:solidFill>
-                <a:latin typeface="+mn-lt"/>
-                <a:ea typeface="+mn-ea"/>
-                <a:cs typeface="+mn-cs"/>
-              </a:defRPr>
-            </a:lvl7pPr>
-            <a:lvl8pPr marL="3200400" algn="l" defTabSz="914400" rtl="0" eaLnBrk="1" latinLnBrk="0" hangingPunct="1">
-              <a:defRPr sz="1800" kern="1200">
-                <a:solidFill>
-                  <a:schemeClr val="tx1"/>
-                </a:solidFill>
-                <a:latin typeface="+mn-lt"/>
-                <a:ea typeface="+mn-ea"/>
-                <a:cs typeface="+mn-cs"/>
-              </a:defRPr>
-            </a:lvl8pPr>
-            <a:lvl9pPr marL="3657600" algn="l" defTabSz="914400" rtl="0" eaLnBrk="1" latinLnBrk="0" hangingPunct="1">
-              <a:defRPr sz="1800" kern="1200">
-                <a:solidFill>
-                  <a:schemeClr val="tx1"/>
-                </a:solidFill>
-                <a:latin typeface="+mn-lt"/>
-                <a:ea typeface="+mn-ea"/>
-                <a:cs typeface="+mn-cs"/>
-              </a:defRPr>
-            </a:lvl9pPr>
-          </a:lstStyle>
-          <a:p>
-            <a:pPr marL="0" marR="0" lvl="0" indent="0" algn="ctr" defTabSz="914400" rtl="0" eaLnBrk="1" fontAlgn="auto" latinLnBrk="0" hangingPunct="1">
-              <a:lnSpc>
-                <a:spcPct val="100000"/>
-              </a:lnSpc>
-              <a:spcBef>
-                <a:spcPts val="0"/>
-              </a:spcBef>
-              <a:spcAft>
-                <a:spcPts val="0"/>
-              </a:spcAft>
-              <a:buClrTx/>
-              <a:buSzTx/>
-              <a:buFontTx/>
-              <a:buNone/>
-              <a:tabLst/>
-              <a:defRPr/>
-            </a:pPr>
-            <a:r>
-              <a:rPr kumimoji="0" lang="en-US" sz="1200" b="0" i="0" u="none" strike="noStrike" kern="1200" cap="none" spc="0" normalizeH="0" baseline="0" noProof="0">
-                <a:ln>
-                  <a:noFill/>
-                </a:ln>
-                <a:solidFill>
-                  <a:prstClr val="black">
-                    <a:tint val="75000"/>
-                  </a:prstClr>
-                </a:solidFill>
-                <a:effectLst/>
-                <a:uLnTx/>
-                <a:uFillTx/>
-                <a:latin typeface="Calibri" panose="020F0502020204030204"/>
-                <a:ea typeface="+mn-ea"/>
-                <a:cs typeface="+mn-cs"/>
-              </a:rPr>
-              <a:t>© Software Architecture</a:t>
-            </a:r>
-            <a:endParaRPr kumimoji="0" lang="en-AU" sz="1200" b="0" i="0" u="none" strike="noStrike" kern="1200" cap="none" spc="0" normalizeH="0" baseline="0" noProof="0" dirty="0">
-              <a:ln>
-                <a:noFill/>
-              </a:ln>
-              <a:solidFill>
-                <a:prstClr val="black">
-                  <a:tint val="75000"/>
-                </a:prstClr>
-              </a:solidFill>
-              <a:effectLst/>
-              <a:uLnTx/>
-              <a:uFillTx/>
-              <a:latin typeface="Calibri" panose="020F0502020204030204"/>
-              <a:ea typeface="+mn-ea"/>
-              <a:cs typeface="+mn-cs"/>
-            </a:endParaRPr>
-          </a:p>
-        </p:txBody>
-      </p:sp>
-    </p:spTree>
-    <p:extLst>
-      <p:ext uri="{BB962C8B-B14F-4D97-AF65-F5344CB8AC3E}">
-        <p14:creationId xmlns:p14="http://schemas.microsoft.com/office/powerpoint/2010/main" val="3482998003"/>
-      </p:ext>
-    </p:extLst>
-  </p:cSld>
-  <p:clrMapOvr>
-    <a:masterClrMapping/>
-  </p:clrMapOvr>
-  <p:timing>
-    <p:tnLst>
-      <p:par>
-        <p:cTn id="1" dur="indefinite" restart="never" nodeType="tmRoot">
-          <p:childTnLst>
-            <p:seq concurrent="1" nextAc="seek">
-              <p:cTn id="2" dur="indefinite" nodeType="mainSeq">
-                <p:childTnLst>
-                  <p:par>
-                    <p:cTn id="3" fill="hold">
-                      <p:stCondLst>
-                        <p:cond delay="indefinite"/>
-                      </p:stCondLst>
-                      <p:childTnLst>
-                        <p:par>
-                          <p:cTn id="4" fill="hold">
-                            <p:stCondLst>
-                              <p:cond delay="0"/>
-                            </p:stCondLst>
-                            <p:childTnLst>
-                              <p:par>
-                                <p:cTn id="5" presetID="1" presetClass="entr" presetSubtype="0" fill="hold" nodeType="clickEffect">
-                                  <p:stCondLst>
-                                    <p:cond delay="0"/>
-                                  </p:stCondLst>
-                                  <p:childTnLst>
-                                    <p:set>
-                                      <p:cBhvr>
-                                        <p:cTn id="6" dur="1" fill="hold">
-                                          <p:stCondLst>
-                                            <p:cond delay="0"/>
-                                          </p:stCondLst>
-                                        </p:cTn>
-                                        <p:tgtEl>
-                                          <p:spTgt spid="3">
-                                            <p:txEl>
-                                              <p:pRg st="1" end="1"/>
-                                            </p:txEl>
-                                          </p:spTgt>
-                                        </p:tgtEl>
-                                        <p:attrNameLst>
-                                          <p:attrName>style.visibility</p:attrName>
-                                        </p:attrNameLst>
-                                      </p:cBhvr>
-                                      <p:to>
-                                        <p:strVal val="visible"/>
-                                      </p:to>
-                                    </p:set>
-                                  </p:childTnLst>
-                                </p:cTn>
-                              </p:par>
-                            </p:childTnLst>
-                          </p:cTn>
-                        </p:par>
-                      </p:childTnLst>
-                    </p:cTn>
-                  </p:par>
-                  <p:par>
-                    <p:cTn id="7" fill="hold">
-                      <p:stCondLst>
-                        <p:cond delay="indefinite"/>
-                      </p:stCondLst>
-                      <p:childTnLst>
-                        <p:par>
-                          <p:cTn id="8" fill="hold">
-                            <p:stCondLst>
-                              <p:cond delay="0"/>
-                            </p:stCondLst>
-                            <p:childTnLst>
-                              <p:par>
-                                <p:cTn id="9" presetID="1" presetClass="entr" presetSubtype="0" fill="hold" nodeType="clickEffect">
-                                  <p:stCondLst>
-                                    <p:cond delay="0"/>
-                                  </p:stCondLst>
-                                  <p:childTnLst>
-                                    <p:set>
-                                      <p:cBhvr>
-                                        <p:cTn id="10" dur="1" fill="hold">
-                                          <p:stCondLst>
-                                            <p:cond delay="0"/>
-                                          </p:stCondLst>
-                                        </p:cTn>
-                                        <p:tgtEl>
-                                          <p:spTgt spid="3">
-                                            <p:txEl>
-                                              <p:pRg st="2" end="2"/>
-                                            </p:txEl>
-                                          </p:spTgt>
-                                        </p:tgtEl>
-                                        <p:attrNameLst>
-                                          <p:attrName>style.visibility</p:attrName>
-                                        </p:attrNameLst>
-                                      </p:cBhvr>
-                                      <p:to>
-                                        <p:strVal val="visible"/>
-                                      </p:to>
-                                    </p:set>
-                                  </p:childTnLst>
-                                </p:cTn>
-                              </p:par>
-                            </p:childTnLst>
-                          </p:cTn>
-                        </p:par>
-                      </p:childTnLst>
-                    </p:cTn>
-                  </p:par>
-                </p:childTnLst>
-              </p:cTn>
-              <p:prevCondLst>
-                <p:cond evt="onPrev" delay="0">
-                  <p:tgtEl>
-                    <p:sldTgt/>
-                  </p:tgtEl>
-                </p:cond>
-              </p:prevCondLst>
-              <p:nextCondLst>
-                <p:cond evt="onNext" delay="0">
-                  <p:tgtEl>
-                    <p:sldTgt/>
-                  </p:tgtEl>
-                </p:cond>
-              </p:nextCondLst>
-            </p:seq>
-          </p:childTnLst>
-        </p:cTn>
-      </p:par>
-    </p:tnLst>
-  </p:timing>
-</p:sld>
-</file>
-
-<file path=ppt/slides/slide58.xml><?xml version="1.0" encoding="utf-8"?>
-<p:sld xmlns:a="http://schemas.openxmlformats.org/drawingml/2006/main" xmlns:r="http://schemas.openxmlformats.org/officeDocument/2006/relationships" xmlns:p="http://schemas.openxmlformats.org/presentationml/2006/main">
-  <p:cSld>
-    <p:spTree>
-      <p:nvGrpSpPr>
-        <p:cNvPr id="1" name=""/>
-        <p:cNvGrpSpPr/>
-        <p:nvPr/>
-      </p:nvGrpSpPr>
-      <p:grpSpPr>
-        <a:xfrm>
-          <a:off x="0" y="0"/>
-          <a:ext cx="0" cy="0"/>
-          <a:chOff x="0" y="0"/>
-          <a:chExt cx="0" cy="0"/>
-        </a:xfrm>
-      </p:grpSpPr>
-      <p:sp>
-        <p:nvSpPr>
-          <p:cNvPr id="2" name="Title 1"/>
-          <p:cNvSpPr>
-            <a:spLocks noGrp="1"/>
-          </p:cNvSpPr>
-          <p:nvPr>
-            <p:ph type="title"/>
-          </p:nvPr>
-        </p:nvSpPr>
-        <p:spPr/>
-        <p:txBody>
-          <a:bodyPr/>
-          <a:lstStyle/>
-          <a:p>
-            <a:r>
-              <a:rPr lang="en-US" dirty="0"/>
-              <a:t>How Does This Process End?</a:t>
-            </a:r>
-          </a:p>
-        </p:txBody>
-      </p:sp>
-      <p:sp>
-        <p:nvSpPr>
-          <p:cNvPr id="3" name="Content Placeholder 2"/>
-          <p:cNvSpPr>
-            <a:spLocks noGrp="1"/>
-          </p:cNvSpPr>
-          <p:nvPr>
-            <p:ph idx="1"/>
-          </p:nvPr>
-        </p:nvSpPr>
         <p:spPr/>
         <p:txBody>
           <a:bodyPr>
@@ -35330,8 +34877,21 @@
                   <a:srgbClr val="FFFF00"/>
                 </a:highlight>
               </a:rPr>
-              <a:t>Eventually the side-effects of each tactic become small enough to ignore. </a:t>
-            </a:r>
+              <a:t>Eventually the side-effects of each tactic become small enough to </a:t>
+            </a:r>
+            <a:r>
+              <a:rPr lang="en-US" sz="3200">
+                <a:highlight>
+                  <a:srgbClr val="FFFF00"/>
+                </a:highlight>
+              </a:rPr>
+              <a:t>ignore.</a:t>
+            </a:r>
+            <a:endParaRPr lang="en-US" sz="3200" dirty="0">
+              <a:highlight>
+                <a:srgbClr val="FFFF00"/>
+              </a:highlight>
+            </a:endParaRPr>
           </a:p>
         </p:txBody>
       </p:sp>
@@ -35699,7 +35259,7 @@
 </p:sld>
 </file>
 
-<file path=ppt/slides/slide59.xml><?xml version="1.0" encoding="utf-8"?>
+<file path=ppt/slides/slide58.xml><?xml version="1.0" encoding="utf-8"?>
 <p:sld xmlns:a="http://schemas.openxmlformats.org/drawingml/2006/main" xmlns:r="http://schemas.openxmlformats.org/officeDocument/2006/relationships" xmlns:p="http://schemas.openxmlformats.org/presentationml/2006/main">
   <p:cSld>
     <p:spTree>

</xml_diff>